<commit_message>
small details figures chapter 1
</commit_message>
<xml_diff>
--- a/Figures/Chapter_01/drawings/Fig1.7_PV_module.pptx
+++ b/Figures/Chapter_01/drawings/Fig1.7_PV_module.pptx
@@ -261,7 +261,7 @@
           <a:p>
             <a:fld id="{8B1A925D-6802-4F82-B3A4-43BDB522D203}" type="datetimeFigureOut">
               <a:rPr lang="en-GB" smtClean="0"/>
-              <a:t>13/07/2022</a:t>
+              <a:t>09/09/2022</a:t>
             </a:fld>
             <a:endParaRPr lang="en-GB"/>
           </a:p>
@@ -461,7 +461,7 @@
           <a:p>
             <a:fld id="{8B1A925D-6802-4F82-B3A4-43BDB522D203}" type="datetimeFigureOut">
               <a:rPr lang="en-GB" smtClean="0"/>
-              <a:t>13/07/2022</a:t>
+              <a:t>09/09/2022</a:t>
             </a:fld>
             <a:endParaRPr lang="en-GB"/>
           </a:p>
@@ -671,7 +671,7 @@
           <a:p>
             <a:fld id="{8B1A925D-6802-4F82-B3A4-43BDB522D203}" type="datetimeFigureOut">
               <a:rPr lang="en-GB" smtClean="0"/>
-              <a:t>13/07/2022</a:t>
+              <a:t>09/09/2022</a:t>
             </a:fld>
             <a:endParaRPr lang="en-GB"/>
           </a:p>
@@ -871,7 +871,7 @@
           <a:p>
             <a:fld id="{8B1A925D-6802-4F82-B3A4-43BDB522D203}" type="datetimeFigureOut">
               <a:rPr lang="en-GB" smtClean="0"/>
-              <a:t>13/07/2022</a:t>
+              <a:t>09/09/2022</a:t>
             </a:fld>
             <a:endParaRPr lang="en-GB"/>
           </a:p>
@@ -1147,7 +1147,7 @@
           <a:p>
             <a:fld id="{8B1A925D-6802-4F82-B3A4-43BDB522D203}" type="datetimeFigureOut">
               <a:rPr lang="en-GB" smtClean="0"/>
-              <a:t>13/07/2022</a:t>
+              <a:t>09/09/2022</a:t>
             </a:fld>
             <a:endParaRPr lang="en-GB"/>
           </a:p>
@@ -1415,7 +1415,7 @@
           <a:p>
             <a:fld id="{8B1A925D-6802-4F82-B3A4-43BDB522D203}" type="datetimeFigureOut">
               <a:rPr lang="en-GB" smtClean="0"/>
-              <a:t>13/07/2022</a:t>
+              <a:t>09/09/2022</a:t>
             </a:fld>
             <a:endParaRPr lang="en-GB"/>
           </a:p>
@@ -1830,7 +1830,7 @@
           <a:p>
             <a:fld id="{8B1A925D-6802-4F82-B3A4-43BDB522D203}" type="datetimeFigureOut">
               <a:rPr lang="en-GB" smtClean="0"/>
-              <a:t>13/07/2022</a:t>
+              <a:t>09/09/2022</a:t>
             </a:fld>
             <a:endParaRPr lang="en-GB"/>
           </a:p>
@@ -1972,7 +1972,7 @@
           <a:p>
             <a:fld id="{8B1A925D-6802-4F82-B3A4-43BDB522D203}" type="datetimeFigureOut">
               <a:rPr lang="en-GB" smtClean="0"/>
-              <a:t>13/07/2022</a:t>
+              <a:t>09/09/2022</a:t>
             </a:fld>
             <a:endParaRPr lang="en-GB"/>
           </a:p>
@@ -2085,7 +2085,7 @@
           <a:p>
             <a:fld id="{8B1A925D-6802-4F82-B3A4-43BDB522D203}" type="datetimeFigureOut">
               <a:rPr lang="en-GB" smtClean="0"/>
-              <a:t>13/07/2022</a:t>
+              <a:t>09/09/2022</a:t>
             </a:fld>
             <a:endParaRPr lang="en-GB"/>
           </a:p>
@@ -2398,7 +2398,7 @@
           <a:p>
             <a:fld id="{8B1A925D-6802-4F82-B3A4-43BDB522D203}" type="datetimeFigureOut">
               <a:rPr lang="en-GB" smtClean="0"/>
-              <a:t>13/07/2022</a:t>
+              <a:t>09/09/2022</a:t>
             </a:fld>
             <a:endParaRPr lang="en-GB"/>
           </a:p>
@@ -2687,7 +2687,7 @@
           <a:p>
             <a:fld id="{8B1A925D-6802-4F82-B3A4-43BDB522D203}" type="datetimeFigureOut">
               <a:rPr lang="en-GB" smtClean="0"/>
-              <a:t>13/07/2022</a:t>
+              <a:t>09/09/2022</a:t>
             </a:fld>
             <a:endParaRPr lang="en-GB"/>
           </a:p>
@@ -2930,7 +2930,7 @@
           <a:p>
             <a:fld id="{8B1A925D-6802-4F82-B3A4-43BDB522D203}" type="datetimeFigureOut">
               <a:rPr lang="en-GB" smtClean="0"/>
-              <a:t>13/07/2022</a:t>
+              <a:t>09/09/2022</a:t>
             </a:fld>
             <a:endParaRPr lang="en-GB"/>
           </a:p>
@@ -14048,11 +14048,18 @@
           <a:lstStyle/>
           <a:p>
             <a:r>
+              <a:rPr lang="en-GB" sz="2400">
+                <a:latin typeface="Arial" panose="020B0604020202020204" pitchFamily="34" charset="0"/>
+                <a:cs typeface="Arial" panose="020B0604020202020204" pitchFamily="34" charset="0"/>
+              </a:rPr>
+              <a:t>Backsheet</a:t>
+            </a:r>
+            <a:r>
               <a:rPr lang="en-GB" sz="2400" dirty="0">
                 <a:latin typeface="Arial" panose="020B0604020202020204" pitchFamily="34" charset="0"/>
                 <a:cs typeface="Arial" panose="020B0604020202020204" pitchFamily="34" charset="0"/>
               </a:rPr>
-              <a:t>Back sheet (copolymer)</a:t>
+              <a:t> (copolymer)</a:t>
             </a:r>
           </a:p>
         </p:txBody>

</xml_diff>

<commit_message>
updates Figure chapter 1 for submissions
</commit_message>
<xml_diff>
--- a/Figures/Chapter_01/drawings/Fig1.7_PV_module.pptx
+++ b/Figures/Chapter_01/drawings/Fig1.7_PV_module.pptx
@@ -2,18 +2,18 @@
 <file path=ppt/presentation.xml><?xml version="1.0" encoding="utf-8"?>
 <p:presentation xmlns:a="http://schemas.openxmlformats.org/drawingml/2006/main" xmlns:r="http://schemas.openxmlformats.org/officeDocument/2006/relationships" xmlns:p="http://schemas.openxmlformats.org/presentationml/2006/main" saveSubsetFonts="1">
   <p:sldMasterIdLst>
-    <p:sldMasterId id="2147483648" r:id="rId1"/>
+    <p:sldMasterId id="2147483672" r:id="rId1"/>
   </p:sldMasterIdLst>
   <p:sldIdLst>
     <p:sldId id="260" r:id="rId2"/>
   </p:sldIdLst>
-  <p:sldSz cx="12192000" cy="6858000"/>
+  <p:sldSz cx="21599525" cy="6858000"/>
   <p:notesSz cx="6858000" cy="9144000"/>
   <p:defaultTextStyle>
     <a:defPPr>
       <a:defRPr lang="en-US"/>
     </a:defPPr>
-    <a:lvl1pPr marL="0" algn="l" defTabSz="914400" rtl="0" eaLnBrk="1" latinLnBrk="0" hangingPunct="1">
+    <a:lvl1pPr marL="0" algn="l" defTabSz="457200" rtl="0" eaLnBrk="1" latinLnBrk="0" hangingPunct="1">
       <a:defRPr sz="1800" kern="1200">
         <a:solidFill>
           <a:schemeClr val="tx1"/>
@@ -23,7 +23,7 @@
         <a:cs typeface="+mn-cs"/>
       </a:defRPr>
     </a:lvl1pPr>
-    <a:lvl2pPr marL="457200" algn="l" defTabSz="914400" rtl="0" eaLnBrk="1" latinLnBrk="0" hangingPunct="1">
+    <a:lvl2pPr marL="457200" algn="l" defTabSz="457200" rtl="0" eaLnBrk="1" latinLnBrk="0" hangingPunct="1">
       <a:defRPr sz="1800" kern="1200">
         <a:solidFill>
           <a:schemeClr val="tx1"/>
@@ -33,7 +33,7 @@
         <a:cs typeface="+mn-cs"/>
       </a:defRPr>
     </a:lvl2pPr>
-    <a:lvl3pPr marL="914400" algn="l" defTabSz="914400" rtl="0" eaLnBrk="1" latinLnBrk="0" hangingPunct="1">
+    <a:lvl3pPr marL="914400" algn="l" defTabSz="457200" rtl="0" eaLnBrk="1" latinLnBrk="0" hangingPunct="1">
       <a:defRPr sz="1800" kern="1200">
         <a:solidFill>
           <a:schemeClr val="tx1"/>
@@ -43,7 +43,7 @@
         <a:cs typeface="+mn-cs"/>
       </a:defRPr>
     </a:lvl3pPr>
-    <a:lvl4pPr marL="1371600" algn="l" defTabSz="914400" rtl="0" eaLnBrk="1" latinLnBrk="0" hangingPunct="1">
+    <a:lvl4pPr marL="1371600" algn="l" defTabSz="457200" rtl="0" eaLnBrk="1" latinLnBrk="0" hangingPunct="1">
       <a:defRPr sz="1800" kern="1200">
         <a:solidFill>
           <a:schemeClr val="tx1"/>
@@ -53,7 +53,7 @@
         <a:cs typeface="+mn-cs"/>
       </a:defRPr>
     </a:lvl4pPr>
-    <a:lvl5pPr marL="1828800" algn="l" defTabSz="914400" rtl="0" eaLnBrk="1" latinLnBrk="0" hangingPunct="1">
+    <a:lvl5pPr marL="1828800" algn="l" defTabSz="457200" rtl="0" eaLnBrk="1" latinLnBrk="0" hangingPunct="1">
       <a:defRPr sz="1800" kern="1200">
         <a:solidFill>
           <a:schemeClr val="tx1"/>
@@ -63,7 +63,7 @@
         <a:cs typeface="+mn-cs"/>
       </a:defRPr>
     </a:lvl5pPr>
-    <a:lvl6pPr marL="2286000" algn="l" defTabSz="914400" rtl="0" eaLnBrk="1" latinLnBrk="0" hangingPunct="1">
+    <a:lvl6pPr marL="2286000" algn="l" defTabSz="457200" rtl="0" eaLnBrk="1" latinLnBrk="0" hangingPunct="1">
       <a:defRPr sz="1800" kern="1200">
         <a:solidFill>
           <a:schemeClr val="tx1"/>
@@ -73,7 +73,7 @@
         <a:cs typeface="+mn-cs"/>
       </a:defRPr>
     </a:lvl6pPr>
-    <a:lvl7pPr marL="2743200" algn="l" defTabSz="914400" rtl="0" eaLnBrk="1" latinLnBrk="0" hangingPunct="1">
+    <a:lvl7pPr marL="2743200" algn="l" defTabSz="457200" rtl="0" eaLnBrk="1" latinLnBrk="0" hangingPunct="1">
       <a:defRPr sz="1800" kern="1200">
         <a:solidFill>
           <a:schemeClr val="tx1"/>
@@ -83,7 +83,7 @@
         <a:cs typeface="+mn-cs"/>
       </a:defRPr>
     </a:lvl7pPr>
-    <a:lvl8pPr marL="3200400" algn="l" defTabSz="914400" rtl="0" eaLnBrk="1" latinLnBrk="0" hangingPunct="1">
+    <a:lvl8pPr marL="3200400" algn="l" defTabSz="457200" rtl="0" eaLnBrk="1" latinLnBrk="0" hangingPunct="1">
       <a:defRPr sz="1800" kern="1200">
         <a:solidFill>
           <a:schemeClr val="tx1"/>
@@ -93,7 +93,7 @@
         <a:cs typeface="+mn-cs"/>
       </a:defRPr>
     </a:lvl8pPr>
-    <a:lvl9pPr marL="3657600" algn="l" defTabSz="914400" rtl="0" eaLnBrk="1" latinLnBrk="0" hangingPunct="1">
+    <a:lvl9pPr marL="3657600" algn="l" defTabSz="457200" rtl="0" eaLnBrk="1" latinLnBrk="0" hangingPunct="1">
       <a:defRPr sz="1800" kern="1200">
         <a:solidFill>
           <a:schemeClr val="tx1"/>
@@ -131,13 +131,7 @@
       </p:grpSpPr>
       <p:sp>
         <p:nvSpPr>
-          <p:cNvPr id="2" name="Title 1">
-            <a:extLst>
-              <a:ext uri="{FF2B5EF4-FFF2-40B4-BE49-F238E27FC236}">
-                <a16:creationId xmlns:a16="http://schemas.microsoft.com/office/drawing/2014/main" id="{1DC3B0B5-5943-4A73-BD1F-54E102DA0A00}"/>
-              </a:ext>
-            </a:extLst>
-          </p:cNvPr>
+          <p:cNvPr id="2" name="Title 1"/>
           <p:cNvSpPr>
             <a:spLocks noGrp="1"/>
           </p:cNvSpPr>
@@ -147,8 +141,8 @@
         </p:nvSpPr>
         <p:spPr>
           <a:xfrm>
-            <a:off x="1524000" y="1122363"/>
-            <a:ext cx="9144000" cy="2387600"/>
+            <a:off x="2699941" y="1122363"/>
+            <a:ext cx="16199644" cy="2387600"/>
           </a:xfrm>
         </p:spPr>
         <p:txBody>
@@ -163,19 +157,13 @@
               <a:rPr lang="en-US"/>
               <a:t>Click to edit Master title style</a:t>
             </a:r>
-            <a:endParaRPr lang="en-GB"/>
+            <a:endParaRPr lang="en-US" dirty="0"/>
           </a:p>
         </p:txBody>
       </p:sp>
       <p:sp>
         <p:nvSpPr>
-          <p:cNvPr id="3" name="Subtitle 2">
-            <a:extLst>
-              <a:ext uri="{FF2B5EF4-FFF2-40B4-BE49-F238E27FC236}">
-                <a16:creationId xmlns:a16="http://schemas.microsoft.com/office/drawing/2014/main" id="{A69E06D5-A569-421A-A148-33EA2E1AE828}"/>
-              </a:ext>
-            </a:extLst>
-          </p:cNvPr>
+          <p:cNvPr id="3" name="Subtitle 2"/>
           <p:cNvSpPr>
             <a:spLocks noGrp="1"/>
           </p:cNvSpPr>
@@ -185,8 +173,8 @@
         </p:nvSpPr>
         <p:spPr>
           <a:xfrm>
-            <a:off x="1524000" y="3602038"/>
-            <a:ext cx="9144000" cy="1655762"/>
+            <a:off x="2699941" y="3602038"/>
+            <a:ext cx="16199644" cy="1655762"/>
           </a:xfrm>
         </p:spPr>
         <p:txBody>
@@ -234,19 +222,13 @@
               <a:rPr lang="en-US"/>
               <a:t>Click to edit Master subtitle style</a:t>
             </a:r>
-            <a:endParaRPr lang="en-GB"/>
+            <a:endParaRPr lang="en-US" dirty="0"/>
           </a:p>
         </p:txBody>
       </p:sp>
       <p:sp>
         <p:nvSpPr>
-          <p:cNvPr id="4" name="Date Placeholder 3">
-            <a:extLst>
-              <a:ext uri="{FF2B5EF4-FFF2-40B4-BE49-F238E27FC236}">
-                <a16:creationId xmlns:a16="http://schemas.microsoft.com/office/drawing/2014/main" id="{693D17E2-2A48-4960-A9F9-FE152076DE66}"/>
-              </a:ext>
-            </a:extLst>
-          </p:cNvPr>
+          <p:cNvPr id="4" name="Date Placeholder 3"/>
           <p:cNvSpPr>
             <a:spLocks noGrp="1"/>
           </p:cNvSpPr>
@@ -261,7 +243,7 @@
           <a:p>
             <a:fld id="{8B1A925D-6802-4F82-B3A4-43BDB522D203}" type="datetimeFigureOut">
               <a:rPr lang="en-GB" smtClean="0"/>
-              <a:t>09/09/2022</a:t>
+              <a:t>30/09/2022</a:t>
             </a:fld>
             <a:endParaRPr lang="en-GB"/>
           </a:p>
@@ -269,13 +251,7 @@
       </p:sp>
       <p:sp>
         <p:nvSpPr>
-          <p:cNvPr id="5" name="Footer Placeholder 4">
-            <a:extLst>
-              <a:ext uri="{FF2B5EF4-FFF2-40B4-BE49-F238E27FC236}">
-                <a16:creationId xmlns:a16="http://schemas.microsoft.com/office/drawing/2014/main" id="{5F36ABE8-B1ED-417F-B6BF-6DF7CC043FFA}"/>
-              </a:ext>
-            </a:extLst>
-          </p:cNvPr>
+          <p:cNvPr id="5" name="Footer Placeholder 4"/>
           <p:cNvSpPr>
             <a:spLocks noGrp="1"/>
           </p:cNvSpPr>
@@ -294,13 +270,7 @@
       </p:sp>
       <p:sp>
         <p:nvSpPr>
-          <p:cNvPr id="6" name="Slide Number Placeholder 5">
-            <a:extLst>
-              <a:ext uri="{FF2B5EF4-FFF2-40B4-BE49-F238E27FC236}">
-                <a16:creationId xmlns:a16="http://schemas.microsoft.com/office/drawing/2014/main" id="{046AF1F0-2995-4B83-84AB-D0F31E32E9E6}"/>
-              </a:ext>
-            </a:extLst>
-          </p:cNvPr>
+          <p:cNvPr id="6" name="Slide Number Placeholder 5"/>
           <p:cNvSpPr>
             <a:spLocks noGrp="1"/>
           </p:cNvSpPr>
@@ -324,7 +294,7 @@
     </p:spTree>
     <p:extLst>
       <p:ext uri="{BB962C8B-B14F-4D97-AF65-F5344CB8AC3E}">
-        <p14:creationId xmlns:p14="http://schemas.microsoft.com/office/powerpoint/2010/main" val="3677927053"/>
+        <p14:creationId xmlns:p14="http://schemas.microsoft.com/office/powerpoint/2010/main" val="3585845362"/>
       </p:ext>
     </p:extLst>
   </p:cSld>
@@ -353,13 +323,7 @@
       </p:grpSpPr>
       <p:sp>
         <p:nvSpPr>
-          <p:cNvPr id="2" name="Title 1">
-            <a:extLst>
-              <a:ext uri="{FF2B5EF4-FFF2-40B4-BE49-F238E27FC236}">
-                <a16:creationId xmlns:a16="http://schemas.microsoft.com/office/drawing/2014/main" id="{DC3002C9-277D-4B3E-8365-90B658992272}"/>
-              </a:ext>
-            </a:extLst>
-          </p:cNvPr>
+          <p:cNvPr id="2" name="Title 1"/>
           <p:cNvSpPr>
             <a:spLocks noGrp="1"/>
           </p:cNvSpPr>
@@ -376,19 +340,13 @@
               <a:rPr lang="en-US"/>
               <a:t>Click to edit Master title style</a:t>
             </a:r>
-            <a:endParaRPr lang="en-GB"/>
+            <a:endParaRPr lang="en-US" dirty="0"/>
           </a:p>
         </p:txBody>
       </p:sp>
       <p:sp>
         <p:nvSpPr>
-          <p:cNvPr id="3" name="Vertical Text Placeholder 2">
-            <a:extLst>
-              <a:ext uri="{FF2B5EF4-FFF2-40B4-BE49-F238E27FC236}">
-                <a16:creationId xmlns:a16="http://schemas.microsoft.com/office/drawing/2014/main" id="{EE2E22A1-9FC5-42FA-ACEC-86FEC4376C18}"/>
-              </a:ext>
-            </a:extLst>
-          </p:cNvPr>
+          <p:cNvPr id="3" name="Vertical Text Placeholder 2"/>
           <p:cNvSpPr>
             <a:spLocks noGrp="1"/>
           </p:cNvSpPr>
@@ -434,19 +392,13 @@
               <a:rPr lang="en-US"/>
               <a:t>Fifth level</a:t>
             </a:r>
-            <a:endParaRPr lang="en-GB"/>
+            <a:endParaRPr lang="en-US" dirty="0"/>
           </a:p>
         </p:txBody>
       </p:sp>
       <p:sp>
         <p:nvSpPr>
-          <p:cNvPr id="4" name="Date Placeholder 3">
-            <a:extLst>
-              <a:ext uri="{FF2B5EF4-FFF2-40B4-BE49-F238E27FC236}">
-                <a16:creationId xmlns:a16="http://schemas.microsoft.com/office/drawing/2014/main" id="{A54A5F96-CAFB-41BD-8F8E-A98F9B61179F}"/>
-              </a:ext>
-            </a:extLst>
-          </p:cNvPr>
+          <p:cNvPr id="4" name="Date Placeholder 3"/>
           <p:cNvSpPr>
             <a:spLocks noGrp="1"/>
           </p:cNvSpPr>
@@ -461,7 +413,7 @@
           <a:p>
             <a:fld id="{8B1A925D-6802-4F82-B3A4-43BDB522D203}" type="datetimeFigureOut">
               <a:rPr lang="en-GB" smtClean="0"/>
-              <a:t>09/09/2022</a:t>
+              <a:t>30/09/2022</a:t>
             </a:fld>
             <a:endParaRPr lang="en-GB"/>
           </a:p>
@@ -469,13 +421,7 @@
       </p:sp>
       <p:sp>
         <p:nvSpPr>
-          <p:cNvPr id="5" name="Footer Placeholder 4">
-            <a:extLst>
-              <a:ext uri="{FF2B5EF4-FFF2-40B4-BE49-F238E27FC236}">
-                <a16:creationId xmlns:a16="http://schemas.microsoft.com/office/drawing/2014/main" id="{985BCEB8-91F6-4CE5-87C5-2F64B620D970}"/>
-              </a:ext>
-            </a:extLst>
-          </p:cNvPr>
+          <p:cNvPr id="5" name="Footer Placeholder 4"/>
           <p:cNvSpPr>
             <a:spLocks noGrp="1"/>
           </p:cNvSpPr>
@@ -494,13 +440,7 @@
       </p:sp>
       <p:sp>
         <p:nvSpPr>
-          <p:cNvPr id="6" name="Slide Number Placeholder 5">
-            <a:extLst>
-              <a:ext uri="{FF2B5EF4-FFF2-40B4-BE49-F238E27FC236}">
-                <a16:creationId xmlns:a16="http://schemas.microsoft.com/office/drawing/2014/main" id="{FB5B22DF-9A93-4751-AF01-CC011FAF7FDE}"/>
-              </a:ext>
-            </a:extLst>
-          </p:cNvPr>
+          <p:cNvPr id="6" name="Slide Number Placeholder 5"/>
           <p:cNvSpPr>
             <a:spLocks noGrp="1"/>
           </p:cNvSpPr>
@@ -524,7 +464,7 @@
     </p:spTree>
     <p:extLst>
       <p:ext uri="{BB962C8B-B14F-4D97-AF65-F5344CB8AC3E}">
-        <p14:creationId xmlns:p14="http://schemas.microsoft.com/office/powerpoint/2010/main" val="3731213337"/>
+        <p14:creationId xmlns:p14="http://schemas.microsoft.com/office/powerpoint/2010/main" val="3344963265"/>
       </p:ext>
     </p:extLst>
   </p:cSld>
@@ -553,13 +493,7 @@
       </p:grpSpPr>
       <p:sp>
         <p:nvSpPr>
-          <p:cNvPr id="2" name="Vertical Title 1">
-            <a:extLst>
-              <a:ext uri="{FF2B5EF4-FFF2-40B4-BE49-F238E27FC236}">
-                <a16:creationId xmlns:a16="http://schemas.microsoft.com/office/drawing/2014/main" id="{DD18F492-A522-46F7-868A-8D6608B30605}"/>
-              </a:ext>
-            </a:extLst>
-          </p:cNvPr>
+          <p:cNvPr id="2" name="Vertical Title 1"/>
           <p:cNvSpPr>
             <a:spLocks noGrp="1"/>
           </p:cNvSpPr>
@@ -569,8 +503,8 @@
         </p:nvSpPr>
         <p:spPr>
           <a:xfrm>
-            <a:off x="8724900" y="365125"/>
-            <a:ext cx="2628900" cy="5811838"/>
+            <a:off x="15457160" y="365125"/>
+            <a:ext cx="4657398" cy="5811838"/>
           </a:xfrm>
         </p:spPr>
         <p:txBody>
@@ -581,19 +515,13 @@
               <a:rPr lang="en-US"/>
               <a:t>Click to edit Master title style</a:t>
             </a:r>
-            <a:endParaRPr lang="en-GB"/>
+            <a:endParaRPr lang="en-US" dirty="0"/>
           </a:p>
         </p:txBody>
       </p:sp>
       <p:sp>
         <p:nvSpPr>
-          <p:cNvPr id="3" name="Vertical Text Placeholder 2">
-            <a:extLst>
-              <a:ext uri="{FF2B5EF4-FFF2-40B4-BE49-F238E27FC236}">
-                <a16:creationId xmlns:a16="http://schemas.microsoft.com/office/drawing/2014/main" id="{C56736E4-F015-49D4-8E06-20DAFA65E881}"/>
-              </a:ext>
-            </a:extLst>
-          </p:cNvPr>
+          <p:cNvPr id="3" name="Vertical Text Placeholder 2"/>
           <p:cNvSpPr>
             <a:spLocks noGrp="1"/>
           </p:cNvSpPr>
@@ -603,8 +531,8 @@
         </p:nvSpPr>
         <p:spPr>
           <a:xfrm>
-            <a:off x="838200" y="365125"/>
-            <a:ext cx="7734300" cy="5811838"/>
+            <a:off x="1484967" y="365125"/>
+            <a:ext cx="13702199" cy="5811838"/>
           </a:xfrm>
         </p:spPr>
         <p:txBody>
@@ -644,19 +572,13 @@
               <a:rPr lang="en-US"/>
               <a:t>Fifth level</a:t>
             </a:r>
-            <a:endParaRPr lang="en-GB"/>
+            <a:endParaRPr lang="en-US" dirty="0"/>
           </a:p>
         </p:txBody>
       </p:sp>
       <p:sp>
         <p:nvSpPr>
-          <p:cNvPr id="4" name="Date Placeholder 3">
-            <a:extLst>
-              <a:ext uri="{FF2B5EF4-FFF2-40B4-BE49-F238E27FC236}">
-                <a16:creationId xmlns:a16="http://schemas.microsoft.com/office/drawing/2014/main" id="{589462FE-FF95-4EFB-8151-A861F0B77608}"/>
-              </a:ext>
-            </a:extLst>
-          </p:cNvPr>
+          <p:cNvPr id="4" name="Date Placeholder 3"/>
           <p:cNvSpPr>
             <a:spLocks noGrp="1"/>
           </p:cNvSpPr>
@@ -671,7 +593,7 @@
           <a:p>
             <a:fld id="{8B1A925D-6802-4F82-B3A4-43BDB522D203}" type="datetimeFigureOut">
               <a:rPr lang="en-GB" smtClean="0"/>
-              <a:t>09/09/2022</a:t>
+              <a:t>30/09/2022</a:t>
             </a:fld>
             <a:endParaRPr lang="en-GB"/>
           </a:p>
@@ -679,13 +601,7 @@
       </p:sp>
       <p:sp>
         <p:nvSpPr>
-          <p:cNvPr id="5" name="Footer Placeholder 4">
-            <a:extLst>
-              <a:ext uri="{FF2B5EF4-FFF2-40B4-BE49-F238E27FC236}">
-                <a16:creationId xmlns:a16="http://schemas.microsoft.com/office/drawing/2014/main" id="{C72B68C6-0EF7-4D55-8AE6-9AD97A4B7824}"/>
-              </a:ext>
-            </a:extLst>
-          </p:cNvPr>
+          <p:cNvPr id="5" name="Footer Placeholder 4"/>
           <p:cNvSpPr>
             <a:spLocks noGrp="1"/>
           </p:cNvSpPr>
@@ -704,13 +620,7 @@
       </p:sp>
       <p:sp>
         <p:nvSpPr>
-          <p:cNvPr id="6" name="Slide Number Placeholder 5">
-            <a:extLst>
-              <a:ext uri="{FF2B5EF4-FFF2-40B4-BE49-F238E27FC236}">
-                <a16:creationId xmlns:a16="http://schemas.microsoft.com/office/drawing/2014/main" id="{8B0566F3-A943-44F7-9863-2E202A151D40}"/>
-              </a:ext>
-            </a:extLst>
-          </p:cNvPr>
+          <p:cNvPr id="6" name="Slide Number Placeholder 5"/>
           <p:cNvSpPr>
             <a:spLocks noGrp="1"/>
           </p:cNvSpPr>
@@ -734,7 +644,7 @@
     </p:spTree>
     <p:extLst>
       <p:ext uri="{BB962C8B-B14F-4D97-AF65-F5344CB8AC3E}">
-        <p14:creationId xmlns:p14="http://schemas.microsoft.com/office/powerpoint/2010/main" val="3888743208"/>
+        <p14:creationId xmlns:p14="http://schemas.microsoft.com/office/powerpoint/2010/main" val="2976938735"/>
       </p:ext>
     </p:extLst>
   </p:cSld>
@@ -763,13 +673,7 @@
       </p:grpSpPr>
       <p:sp>
         <p:nvSpPr>
-          <p:cNvPr id="2" name="Title 1">
-            <a:extLst>
-              <a:ext uri="{FF2B5EF4-FFF2-40B4-BE49-F238E27FC236}">
-                <a16:creationId xmlns:a16="http://schemas.microsoft.com/office/drawing/2014/main" id="{9D40A542-2CEF-45F8-8843-AB517D2CA76A}"/>
-              </a:ext>
-            </a:extLst>
-          </p:cNvPr>
+          <p:cNvPr id="2" name="Title 1"/>
           <p:cNvSpPr>
             <a:spLocks noGrp="1"/>
           </p:cNvSpPr>
@@ -786,19 +690,13 @@
               <a:rPr lang="en-US"/>
               <a:t>Click to edit Master title style</a:t>
             </a:r>
-            <a:endParaRPr lang="en-GB"/>
+            <a:endParaRPr lang="en-US" dirty="0"/>
           </a:p>
         </p:txBody>
       </p:sp>
       <p:sp>
         <p:nvSpPr>
-          <p:cNvPr id="3" name="Content Placeholder 2">
-            <a:extLst>
-              <a:ext uri="{FF2B5EF4-FFF2-40B4-BE49-F238E27FC236}">
-                <a16:creationId xmlns:a16="http://schemas.microsoft.com/office/drawing/2014/main" id="{D78FB555-4178-4569-BE6A-3C85CF8E7682}"/>
-              </a:ext>
-            </a:extLst>
-          </p:cNvPr>
+          <p:cNvPr id="3" name="Content Placeholder 2"/>
           <p:cNvSpPr>
             <a:spLocks noGrp="1"/>
           </p:cNvSpPr>
@@ -844,19 +742,13 @@
               <a:rPr lang="en-US"/>
               <a:t>Fifth level</a:t>
             </a:r>
-            <a:endParaRPr lang="en-GB"/>
+            <a:endParaRPr lang="en-US" dirty="0"/>
           </a:p>
         </p:txBody>
       </p:sp>
       <p:sp>
         <p:nvSpPr>
-          <p:cNvPr id="4" name="Date Placeholder 3">
-            <a:extLst>
-              <a:ext uri="{FF2B5EF4-FFF2-40B4-BE49-F238E27FC236}">
-                <a16:creationId xmlns:a16="http://schemas.microsoft.com/office/drawing/2014/main" id="{83BD51A0-9CCD-438A-A1D2-D837267F8BD7}"/>
-              </a:ext>
-            </a:extLst>
-          </p:cNvPr>
+          <p:cNvPr id="4" name="Date Placeholder 3"/>
           <p:cNvSpPr>
             <a:spLocks noGrp="1"/>
           </p:cNvSpPr>
@@ -871,7 +763,7 @@
           <a:p>
             <a:fld id="{8B1A925D-6802-4F82-B3A4-43BDB522D203}" type="datetimeFigureOut">
               <a:rPr lang="en-GB" smtClean="0"/>
-              <a:t>09/09/2022</a:t>
+              <a:t>30/09/2022</a:t>
             </a:fld>
             <a:endParaRPr lang="en-GB"/>
           </a:p>
@@ -879,13 +771,7 @@
       </p:sp>
       <p:sp>
         <p:nvSpPr>
-          <p:cNvPr id="5" name="Footer Placeholder 4">
-            <a:extLst>
-              <a:ext uri="{FF2B5EF4-FFF2-40B4-BE49-F238E27FC236}">
-                <a16:creationId xmlns:a16="http://schemas.microsoft.com/office/drawing/2014/main" id="{500A4BF8-99B9-402B-989E-4EA47EAC5CCA}"/>
-              </a:ext>
-            </a:extLst>
-          </p:cNvPr>
+          <p:cNvPr id="5" name="Footer Placeholder 4"/>
           <p:cNvSpPr>
             <a:spLocks noGrp="1"/>
           </p:cNvSpPr>
@@ -904,13 +790,7 @@
       </p:sp>
       <p:sp>
         <p:nvSpPr>
-          <p:cNvPr id="6" name="Slide Number Placeholder 5">
-            <a:extLst>
-              <a:ext uri="{FF2B5EF4-FFF2-40B4-BE49-F238E27FC236}">
-                <a16:creationId xmlns:a16="http://schemas.microsoft.com/office/drawing/2014/main" id="{E26FB25A-D6F5-4D97-B70B-D51A11FC30B9}"/>
-              </a:ext>
-            </a:extLst>
-          </p:cNvPr>
+          <p:cNvPr id="6" name="Slide Number Placeholder 5"/>
           <p:cNvSpPr>
             <a:spLocks noGrp="1"/>
           </p:cNvSpPr>
@@ -934,7 +814,7 @@
     </p:spTree>
     <p:extLst>
       <p:ext uri="{BB962C8B-B14F-4D97-AF65-F5344CB8AC3E}">
-        <p14:creationId xmlns:p14="http://schemas.microsoft.com/office/powerpoint/2010/main" val="4219125338"/>
+        <p14:creationId xmlns:p14="http://schemas.microsoft.com/office/powerpoint/2010/main" val="3340322324"/>
       </p:ext>
     </p:extLst>
   </p:cSld>
@@ -963,13 +843,7 @@
       </p:grpSpPr>
       <p:sp>
         <p:nvSpPr>
-          <p:cNvPr id="2" name="Title 1">
-            <a:extLst>
-              <a:ext uri="{FF2B5EF4-FFF2-40B4-BE49-F238E27FC236}">
-                <a16:creationId xmlns:a16="http://schemas.microsoft.com/office/drawing/2014/main" id="{D282B498-2304-4D0C-B9F8-418DC144D084}"/>
-              </a:ext>
-            </a:extLst>
-          </p:cNvPr>
+          <p:cNvPr id="2" name="Title 1"/>
           <p:cNvSpPr>
             <a:spLocks noGrp="1"/>
           </p:cNvSpPr>
@@ -979,8 +853,8 @@
         </p:nvSpPr>
         <p:spPr>
           <a:xfrm>
-            <a:off x="831850" y="1709738"/>
-            <a:ext cx="10515600" cy="2852737"/>
+            <a:off x="1473718" y="1709739"/>
+            <a:ext cx="18629590" cy="2852737"/>
           </a:xfrm>
         </p:spPr>
         <p:txBody>
@@ -995,19 +869,13 @@
               <a:rPr lang="en-US"/>
               <a:t>Click to edit Master title style</a:t>
             </a:r>
-            <a:endParaRPr lang="en-GB"/>
+            <a:endParaRPr lang="en-US" dirty="0"/>
           </a:p>
         </p:txBody>
       </p:sp>
       <p:sp>
         <p:nvSpPr>
-          <p:cNvPr id="3" name="Text Placeholder 2">
-            <a:extLst>
-              <a:ext uri="{FF2B5EF4-FFF2-40B4-BE49-F238E27FC236}">
-                <a16:creationId xmlns:a16="http://schemas.microsoft.com/office/drawing/2014/main" id="{76DEC5C6-9393-44B9-B466-87596FAB7A12}"/>
-              </a:ext>
-            </a:extLst>
-          </p:cNvPr>
+          <p:cNvPr id="3" name="Text Placeholder 2"/>
           <p:cNvSpPr>
             <a:spLocks noGrp="1"/>
           </p:cNvSpPr>
@@ -1017,8 +885,8 @@
         </p:nvSpPr>
         <p:spPr>
           <a:xfrm>
-            <a:off x="831850" y="4589463"/>
-            <a:ext cx="10515600" cy="1500187"/>
+            <a:off x="1473718" y="4589464"/>
+            <a:ext cx="18629590" cy="1500187"/>
           </a:xfrm>
         </p:spPr>
         <p:txBody>
@@ -1126,13 +994,7 @@
       </p:sp>
       <p:sp>
         <p:nvSpPr>
-          <p:cNvPr id="4" name="Date Placeholder 3">
-            <a:extLst>
-              <a:ext uri="{FF2B5EF4-FFF2-40B4-BE49-F238E27FC236}">
-                <a16:creationId xmlns:a16="http://schemas.microsoft.com/office/drawing/2014/main" id="{9877353F-69F2-4F6C-B0A3-A749F9389472}"/>
-              </a:ext>
-            </a:extLst>
-          </p:cNvPr>
+          <p:cNvPr id="4" name="Date Placeholder 3"/>
           <p:cNvSpPr>
             <a:spLocks noGrp="1"/>
           </p:cNvSpPr>
@@ -1147,7 +1009,7 @@
           <a:p>
             <a:fld id="{8B1A925D-6802-4F82-B3A4-43BDB522D203}" type="datetimeFigureOut">
               <a:rPr lang="en-GB" smtClean="0"/>
-              <a:t>09/09/2022</a:t>
+              <a:t>30/09/2022</a:t>
             </a:fld>
             <a:endParaRPr lang="en-GB"/>
           </a:p>
@@ -1155,13 +1017,7 @@
       </p:sp>
       <p:sp>
         <p:nvSpPr>
-          <p:cNvPr id="5" name="Footer Placeholder 4">
-            <a:extLst>
-              <a:ext uri="{FF2B5EF4-FFF2-40B4-BE49-F238E27FC236}">
-                <a16:creationId xmlns:a16="http://schemas.microsoft.com/office/drawing/2014/main" id="{23F3E4BB-53E8-4485-8E52-78859DAE0D4A}"/>
-              </a:ext>
-            </a:extLst>
-          </p:cNvPr>
+          <p:cNvPr id="5" name="Footer Placeholder 4"/>
           <p:cNvSpPr>
             <a:spLocks noGrp="1"/>
           </p:cNvSpPr>
@@ -1180,13 +1036,7 @@
       </p:sp>
       <p:sp>
         <p:nvSpPr>
-          <p:cNvPr id="6" name="Slide Number Placeholder 5">
-            <a:extLst>
-              <a:ext uri="{FF2B5EF4-FFF2-40B4-BE49-F238E27FC236}">
-                <a16:creationId xmlns:a16="http://schemas.microsoft.com/office/drawing/2014/main" id="{A593A8C5-72AC-4FC1-8913-20F68B7BA7F9}"/>
-              </a:ext>
-            </a:extLst>
-          </p:cNvPr>
+          <p:cNvPr id="6" name="Slide Number Placeholder 5"/>
           <p:cNvSpPr>
             <a:spLocks noGrp="1"/>
           </p:cNvSpPr>
@@ -1210,7 +1060,7 @@
     </p:spTree>
     <p:extLst>
       <p:ext uri="{BB962C8B-B14F-4D97-AF65-F5344CB8AC3E}">
-        <p14:creationId xmlns:p14="http://schemas.microsoft.com/office/powerpoint/2010/main" val="1562466500"/>
+        <p14:creationId xmlns:p14="http://schemas.microsoft.com/office/powerpoint/2010/main" val="3099674857"/>
       </p:ext>
     </p:extLst>
   </p:cSld>
@@ -1239,13 +1089,7 @@
       </p:grpSpPr>
       <p:sp>
         <p:nvSpPr>
-          <p:cNvPr id="2" name="Title 1">
-            <a:extLst>
-              <a:ext uri="{FF2B5EF4-FFF2-40B4-BE49-F238E27FC236}">
-                <a16:creationId xmlns:a16="http://schemas.microsoft.com/office/drawing/2014/main" id="{55A23861-438E-4D5D-B5D9-8C80BB51D40A}"/>
-              </a:ext>
-            </a:extLst>
-          </p:cNvPr>
+          <p:cNvPr id="2" name="Title 1"/>
           <p:cNvSpPr>
             <a:spLocks noGrp="1"/>
           </p:cNvSpPr>
@@ -1262,19 +1106,13 @@
               <a:rPr lang="en-US"/>
               <a:t>Click to edit Master title style</a:t>
             </a:r>
-            <a:endParaRPr lang="en-GB"/>
+            <a:endParaRPr lang="en-US" dirty="0"/>
           </a:p>
         </p:txBody>
       </p:sp>
       <p:sp>
         <p:nvSpPr>
-          <p:cNvPr id="3" name="Content Placeholder 2">
-            <a:extLst>
-              <a:ext uri="{FF2B5EF4-FFF2-40B4-BE49-F238E27FC236}">
-                <a16:creationId xmlns:a16="http://schemas.microsoft.com/office/drawing/2014/main" id="{58FB26EF-95A5-469B-9EC1-37EA85822757}"/>
-              </a:ext>
-            </a:extLst>
-          </p:cNvPr>
+          <p:cNvPr id="3" name="Content Placeholder 2"/>
           <p:cNvSpPr>
             <a:spLocks noGrp="1"/>
           </p:cNvSpPr>
@@ -1284,8 +1122,8 @@
         </p:nvSpPr>
         <p:spPr>
           <a:xfrm>
-            <a:off x="838200" y="1825625"/>
-            <a:ext cx="5181600" cy="4351338"/>
+            <a:off x="1484967" y="1825625"/>
+            <a:ext cx="9179798" cy="4351338"/>
           </a:xfrm>
         </p:spPr>
         <p:txBody>
@@ -1325,19 +1163,13 @@
               <a:rPr lang="en-US"/>
               <a:t>Fifth level</a:t>
             </a:r>
-            <a:endParaRPr lang="en-GB"/>
+            <a:endParaRPr lang="en-US" dirty="0"/>
           </a:p>
         </p:txBody>
       </p:sp>
       <p:sp>
         <p:nvSpPr>
-          <p:cNvPr id="4" name="Content Placeholder 3">
-            <a:extLst>
-              <a:ext uri="{FF2B5EF4-FFF2-40B4-BE49-F238E27FC236}">
-                <a16:creationId xmlns:a16="http://schemas.microsoft.com/office/drawing/2014/main" id="{DCB72C46-50AE-4869-9619-472D1C57A4A6}"/>
-              </a:ext>
-            </a:extLst>
-          </p:cNvPr>
+          <p:cNvPr id="4" name="Content Placeholder 3"/>
           <p:cNvSpPr>
             <a:spLocks noGrp="1"/>
           </p:cNvSpPr>
@@ -1347,8 +1179,8 @@
         </p:nvSpPr>
         <p:spPr>
           <a:xfrm>
-            <a:off x="6172200" y="1825625"/>
-            <a:ext cx="5181600" cy="4351338"/>
+            <a:off x="10934760" y="1825625"/>
+            <a:ext cx="9179798" cy="4351338"/>
           </a:xfrm>
         </p:spPr>
         <p:txBody>
@@ -1388,19 +1220,13 @@
               <a:rPr lang="en-US"/>
               <a:t>Fifth level</a:t>
             </a:r>
-            <a:endParaRPr lang="en-GB"/>
+            <a:endParaRPr lang="en-US" dirty="0"/>
           </a:p>
         </p:txBody>
       </p:sp>
       <p:sp>
         <p:nvSpPr>
-          <p:cNvPr id="5" name="Date Placeholder 4">
-            <a:extLst>
-              <a:ext uri="{FF2B5EF4-FFF2-40B4-BE49-F238E27FC236}">
-                <a16:creationId xmlns:a16="http://schemas.microsoft.com/office/drawing/2014/main" id="{F5E43937-3567-49F4-AA28-585AB205D715}"/>
-              </a:ext>
-            </a:extLst>
-          </p:cNvPr>
+          <p:cNvPr id="5" name="Date Placeholder 4"/>
           <p:cNvSpPr>
             <a:spLocks noGrp="1"/>
           </p:cNvSpPr>
@@ -1415,7 +1241,7 @@
           <a:p>
             <a:fld id="{8B1A925D-6802-4F82-B3A4-43BDB522D203}" type="datetimeFigureOut">
               <a:rPr lang="en-GB" smtClean="0"/>
-              <a:t>09/09/2022</a:t>
+              <a:t>30/09/2022</a:t>
             </a:fld>
             <a:endParaRPr lang="en-GB"/>
           </a:p>
@@ -1423,13 +1249,7 @@
       </p:sp>
       <p:sp>
         <p:nvSpPr>
-          <p:cNvPr id="6" name="Footer Placeholder 5">
-            <a:extLst>
-              <a:ext uri="{FF2B5EF4-FFF2-40B4-BE49-F238E27FC236}">
-                <a16:creationId xmlns:a16="http://schemas.microsoft.com/office/drawing/2014/main" id="{6F9C6075-742F-4F32-A919-95E94E11EE9E}"/>
-              </a:ext>
-            </a:extLst>
-          </p:cNvPr>
+          <p:cNvPr id="6" name="Footer Placeholder 5"/>
           <p:cNvSpPr>
             <a:spLocks noGrp="1"/>
           </p:cNvSpPr>
@@ -1448,13 +1268,7 @@
       </p:sp>
       <p:sp>
         <p:nvSpPr>
-          <p:cNvPr id="7" name="Slide Number Placeholder 6">
-            <a:extLst>
-              <a:ext uri="{FF2B5EF4-FFF2-40B4-BE49-F238E27FC236}">
-                <a16:creationId xmlns:a16="http://schemas.microsoft.com/office/drawing/2014/main" id="{BF61EE68-BFCE-41F7-BAFF-8E261D4975DF}"/>
-              </a:ext>
-            </a:extLst>
-          </p:cNvPr>
+          <p:cNvPr id="7" name="Slide Number Placeholder 6"/>
           <p:cNvSpPr>
             <a:spLocks noGrp="1"/>
           </p:cNvSpPr>
@@ -1478,7 +1292,7 @@
     </p:spTree>
     <p:extLst>
       <p:ext uri="{BB962C8B-B14F-4D97-AF65-F5344CB8AC3E}">
-        <p14:creationId xmlns:p14="http://schemas.microsoft.com/office/powerpoint/2010/main" val="2456622676"/>
+        <p14:creationId xmlns:p14="http://schemas.microsoft.com/office/powerpoint/2010/main" val="975577471"/>
       </p:ext>
     </p:extLst>
   </p:cSld>
@@ -1507,13 +1321,7 @@
       </p:grpSpPr>
       <p:sp>
         <p:nvSpPr>
-          <p:cNvPr id="2" name="Title 1">
-            <a:extLst>
-              <a:ext uri="{FF2B5EF4-FFF2-40B4-BE49-F238E27FC236}">
-                <a16:creationId xmlns:a16="http://schemas.microsoft.com/office/drawing/2014/main" id="{949C4E16-BB70-49F2-8BD3-DCEE2AC7CFB4}"/>
-              </a:ext>
-            </a:extLst>
-          </p:cNvPr>
+          <p:cNvPr id="2" name="Title 1"/>
           <p:cNvSpPr>
             <a:spLocks noGrp="1"/>
           </p:cNvSpPr>
@@ -1523,8 +1331,8 @@
         </p:nvSpPr>
         <p:spPr>
           <a:xfrm>
-            <a:off x="839788" y="365125"/>
-            <a:ext cx="10515600" cy="1325563"/>
+            <a:off x="1487781" y="365126"/>
+            <a:ext cx="18629590" cy="1325563"/>
           </a:xfrm>
         </p:spPr>
         <p:txBody>
@@ -1535,19 +1343,13 @@
               <a:rPr lang="en-US"/>
               <a:t>Click to edit Master title style</a:t>
             </a:r>
-            <a:endParaRPr lang="en-GB"/>
+            <a:endParaRPr lang="en-US" dirty="0"/>
           </a:p>
         </p:txBody>
       </p:sp>
       <p:sp>
         <p:nvSpPr>
-          <p:cNvPr id="3" name="Text Placeholder 2">
-            <a:extLst>
-              <a:ext uri="{FF2B5EF4-FFF2-40B4-BE49-F238E27FC236}">
-                <a16:creationId xmlns:a16="http://schemas.microsoft.com/office/drawing/2014/main" id="{4B3D84EF-3AAB-4B3F-8005-B96FDA462CE9}"/>
-              </a:ext>
-            </a:extLst>
-          </p:cNvPr>
+          <p:cNvPr id="3" name="Text Placeholder 2"/>
           <p:cNvSpPr>
             <a:spLocks noGrp="1"/>
           </p:cNvSpPr>
@@ -1557,8 +1359,8 @@
         </p:nvSpPr>
         <p:spPr>
           <a:xfrm>
-            <a:off x="839788" y="1681163"/>
-            <a:ext cx="5157787" cy="823912"/>
+            <a:off x="1487781" y="1681163"/>
+            <a:ext cx="9137611" cy="823912"/>
           </a:xfrm>
         </p:spPr>
         <p:txBody>
@@ -1612,13 +1414,7 @@
       </p:sp>
       <p:sp>
         <p:nvSpPr>
-          <p:cNvPr id="4" name="Content Placeholder 3">
-            <a:extLst>
-              <a:ext uri="{FF2B5EF4-FFF2-40B4-BE49-F238E27FC236}">
-                <a16:creationId xmlns:a16="http://schemas.microsoft.com/office/drawing/2014/main" id="{791FFB67-278E-4BD9-8248-C22B550B57E9}"/>
-              </a:ext>
-            </a:extLst>
-          </p:cNvPr>
+          <p:cNvPr id="4" name="Content Placeholder 3"/>
           <p:cNvSpPr>
             <a:spLocks noGrp="1"/>
           </p:cNvSpPr>
@@ -1628,8 +1424,8 @@
         </p:nvSpPr>
         <p:spPr>
           <a:xfrm>
-            <a:off x="839788" y="2505075"/>
-            <a:ext cx="5157787" cy="3684588"/>
+            <a:off x="1487781" y="2505075"/>
+            <a:ext cx="9137611" cy="3684588"/>
           </a:xfrm>
         </p:spPr>
         <p:txBody>
@@ -1669,19 +1465,13 @@
               <a:rPr lang="en-US"/>
               <a:t>Fifth level</a:t>
             </a:r>
-            <a:endParaRPr lang="en-GB"/>
+            <a:endParaRPr lang="en-US" dirty="0"/>
           </a:p>
         </p:txBody>
       </p:sp>
       <p:sp>
         <p:nvSpPr>
-          <p:cNvPr id="5" name="Text Placeholder 4">
-            <a:extLst>
-              <a:ext uri="{FF2B5EF4-FFF2-40B4-BE49-F238E27FC236}">
-                <a16:creationId xmlns:a16="http://schemas.microsoft.com/office/drawing/2014/main" id="{9CEB107E-5D38-4D91-8441-FEF3FBAF6273}"/>
-              </a:ext>
-            </a:extLst>
-          </p:cNvPr>
+          <p:cNvPr id="5" name="Text Placeholder 4"/>
           <p:cNvSpPr>
             <a:spLocks noGrp="1"/>
           </p:cNvSpPr>
@@ -1691,8 +1481,8 @@
         </p:nvSpPr>
         <p:spPr>
           <a:xfrm>
-            <a:off x="6172200" y="1681163"/>
-            <a:ext cx="5183188" cy="823912"/>
+            <a:off x="10934760" y="1681163"/>
+            <a:ext cx="9182611" cy="823912"/>
           </a:xfrm>
         </p:spPr>
         <p:txBody>
@@ -1746,13 +1536,7 @@
       </p:sp>
       <p:sp>
         <p:nvSpPr>
-          <p:cNvPr id="6" name="Content Placeholder 5">
-            <a:extLst>
-              <a:ext uri="{FF2B5EF4-FFF2-40B4-BE49-F238E27FC236}">
-                <a16:creationId xmlns:a16="http://schemas.microsoft.com/office/drawing/2014/main" id="{D71F4213-D510-4CE0-8EB4-FFCA0BAAA894}"/>
-              </a:ext>
-            </a:extLst>
-          </p:cNvPr>
+          <p:cNvPr id="6" name="Content Placeholder 5"/>
           <p:cNvSpPr>
             <a:spLocks noGrp="1"/>
           </p:cNvSpPr>
@@ -1762,8 +1546,8 @@
         </p:nvSpPr>
         <p:spPr>
           <a:xfrm>
-            <a:off x="6172200" y="2505075"/>
-            <a:ext cx="5183188" cy="3684588"/>
+            <a:off x="10934760" y="2505075"/>
+            <a:ext cx="9182611" cy="3684588"/>
           </a:xfrm>
         </p:spPr>
         <p:txBody>
@@ -1803,19 +1587,13 @@
               <a:rPr lang="en-US"/>
               <a:t>Fifth level</a:t>
             </a:r>
-            <a:endParaRPr lang="en-GB"/>
+            <a:endParaRPr lang="en-US" dirty="0"/>
           </a:p>
         </p:txBody>
       </p:sp>
       <p:sp>
         <p:nvSpPr>
-          <p:cNvPr id="7" name="Date Placeholder 6">
-            <a:extLst>
-              <a:ext uri="{FF2B5EF4-FFF2-40B4-BE49-F238E27FC236}">
-                <a16:creationId xmlns:a16="http://schemas.microsoft.com/office/drawing/2014/main" id="{EAE41CD7-E67D-4E52-AF26-62983D2B0B21}"/>
-              </a:ext>
-            </a:extLst>
-          </p:cNvPr>
+          <p:cNvPr id="7" name="Date Placeholder 6"/>
           <p:cNvSpPr>
             <a:spLocks noGrp="1"/>
           </p:cNvSpPr>
@@ -1830,7 +1608,7 @@
           <a:p>
             <a:fld id="{8B1A925D-6802-4F82-B3A4-43BDB522D203}" type="datetimeFigureOut">
               <a:rPr lang="en-GB" smtClean="0"/>
-              <a:t>09/09/2022</a:t>
+              <a:t>30/09/2022</a:t>
             </a:fld>
             <a:endParaRPr lang="en-GB"/>
           </a:p>
@@ -1838,13 +1616,7 @@
       </p:sp>
       <p:sp>
         <p:nvSpPr>
-          <p:cNvPr id="8" name="Footer Placeholder 7">
-            <a:extLst>
-              <a:ext uri="{FF2B5EF4-FFF2-40B4-BE49-F238E27FC236}">
-                <a16:creationId xmlns:a16="http://schemas.microsoft.com/office/drawing/2014/main" id="{4EB7F2A2-7259-4AA9-9126-F4AF8B89B912}"/>
-              </a:ext>
-            </a:extLst>
-          </p:cNvPr>
+          <p:cNvPr id="8" name="Footer Placeholder 7"/>
           <p:cNvSpPr>
             <a:spLocks noGrp="1"/>
           </p:cNvSpPr>
@@ -1863,13 +1635,7 @@
       </p:sp>
       <p:sp>
         <p:nvSpPr>
-          <p:cNvPr id="9" name="Slide Number Placeholder 8">
-            <a:extLst>
-              <a:ext uri="{FF2B5EF4-FFF2-40B4-BE49-F238E27FC236}">
-                <a16:creationId xmlns:a16="http://schemas.microsoft.com/office/drawing/2014/main" id="{A4D4FCB3-8F6C-414D-9B58-1128B28B93EE}"/>
-              </a:ext>
-            </a:extLst>
-          </p:cNvPr>
+          <p:cNvPr id="9" name="Slide Number Placeholder 8"/>
           <p:cNvSpPr>
             <a:spLocks noGrp="1"/>
           </p:cNvSpPr>
@@ -1893,7 +1659,7 @@
     </p:spTree>
     <p:extLst>
       <p:ext uri="{BB962C8B-B14F-4D97-AF65-F5344CB8AC3E}">
-        <p14:creationId xmlns:p14="http://schemas.microsoft.com/office/powerpoint/2010/main" val="3374216155"/>
+        <p14:creationId xmlns:p14="http://schemas.microsoft.com/office/powerpoint/2010/main" val="2569569015"/>
       </p:ext>
     </p:extLst>
   </p:cSld>
@@ -1922,13 +1688,7 @@
       </p:grpSpPr>
       <p:sp>
         <p:nvSpPr>
-          <p:cNvPr id="2" name="Title 1">
-            <a:extLst>
-              <a:ext uri="{FF2B5EF4-FFF2-40B4-BE49-F238E27FC236}">
-                <a16:creationId xmlns:a16="http://schemas.microsoft.com/office/drawing/2014/main" id="{DCC12632-FD41-4B6D-B86E-A7F59A012982}"/>
-              </a:ext>
-            </a:extLst>
-          </p:cNvPr>
+          <p:cNvPr id="2" name="Title 1"/>
           <p:cNvSpPr>
             <a:spLocks noGrp="1"/>
           </p:cNvSpPr>
@@ -1945,19 +1705,13 @@
               <a:rPr lang="en-US"/>
               <a:t>Click to edit Master title style</a:t>
             </a:r>
-            <a:endParaRPr lang="en-GB"/>
+            <a:endParaRPr lang="en-US" dirty="0"/>
           </a:p>
         </p:txBody>
       </p:sp>
       <p:sp>
         <p:nvSpPr>
-          <p:cNvPr id="3" name="Date Placeholder 2">
-            <a:extLst>
-              <a:ext uri="{FF2B5EF4-FFF2-40B4-BE49-F238E27FC236}">
-                <a16:creationId xmlns:a16="http://schemas.microsoft.com/office/drawing/2014/main" id="{6DB4A2D0-5139-434D-A9CB-B6347943923F}"/>
-              </a:ext>
-            </a:extLst>
-          </p:cNvPr>
+          <p:cNvPr id="3" name="Date Placeholder 2"/>
           <p:cNvSpPr>
             <a:spLocks noGrp="1"/>
           </p:cNvSpPr>
@@ -1972,7 +1726,7 @@
           <a:p>
             <a:fld id="{8B1A925D-6802-4F82-B3A4-43BDB522D203}" type="datetimeFigureOut">
               <a:rPr lang="en-GB" smtClean="0"/>
-              <a:t>09/09/2022</a:t>
+              <a:t>30/09/2022</a:t>
             </a:fld>
             <a:endParaRPr lang="en-GB"/>
           </a:p>
@@ -1980,13 +1734,7 @@
       </p:sp>
       <p:sp>
         <p:nvSpPr>
-          <p:cNvPr id="4" name="Footer Placeholder 3">
-            <a:extLst>
-              <a:ext uri="{FF2B5EF4-FFF2-40B4-BE49-F238E27FC236}">
-                <a16:creationId xmlns:a16="http://schemas.microsoft.com/office/drawing/2014/main" id="{4D71F642-FB95-431B-A495-9F00AD694CC3}"/>
-              </a:ext>
-            </a:extLst>
-          </p:cNvPr>
+          <p:cNvPr id="4" name="Footer Placeholder 3"/>
           <p:cNvSpPr>
             <a:spLocks noGrp="1"/>
           </p:cNvSpPr>
@@ -2005,13 +1753,7 @@
       </p:sp>
       <p:sp>
         <p:nvSpPr>
-          <p:cNvPr id="5" name="Slide Number Placeholder 4">
-            <a:extLst>
-              <a:ext uri="{FF2B5EF4-FFF2-40B4-BE49-F238E27FC236}">
-                <a16:creationId xmlns:a16="http://schemas.microsoft.com/office/drawing/2014/main" id="{A3901E52-A758-4A9E-BC06-D1DDD29A7C6C}"/>
-              </a:ext>
-            </a:extLst>
-          </p:cNvPr>
+          <p:cNvPr id="5" name="Slide Number Placeholder 4"/>
           <p:cNvSpPr>
             <a:spLocks noGrp="1"/>
           </p:cNvSpPr>
@@ -2035,7 +1777,7 @@
     </p:spTree>
     <p:extLst>
       <p:ext uri="{BB962C8B-B14F-4D97-AF65-F5344CB8AC3E}">
-        <p14:creationId xmlns:p14="http://schemas.microsoft.com/office/powerpoint/2010/main" val="3451928385"/>
+        <p14:creationId xmlns:p14="http://schemas.microsoft.com/office/powerpoint/2010/main" val="1499404914"/>
       </p:ext>
     </p:extLst>
   </p:cSld>
@@ -2064,13 +1806,7 @@
       </p:grpSpPr>
       <p:sp>
         <p:nvSpPr>
-          <p:cNvPr id="2" name="Date Placeholder 1">
-            <a:extLst>
-              <a:ext uri="{FF2B5EF4-FFF2-40B4-BE49-F238E27FC236}">
-                <a16:creationId xmlns:a16="http://schemas.microsoft.com/office/drawing/2014/main" id="{67EA4B0E-D806-42D3-B55A-E20B2E4CF5E8}"/>
-              </a:ext>
-            </a:extLst>
-          </p:cNvPr>
+          <p:cNvPr id="2" name="Date Placeholder 1"/>
           <p:cNvSpPr>
             <a:spLocks noGrp="1"/>
           </p:cNvSpPr>
@@ -2085,7 +1821,7 @@
           <a:p>
             <a:fld id="{8B1A925D-6802-4F82-B3A4-43BDB522D203}" type="datetimeFigureOut">
               <a:rPr lang="en-GB" smtClean="0"/>
-              <a:t>09/09/2022</a:t>
+              <a:t>30/09/2022</a:t>
             </a:fld>
             <a:endParaRPr lang="en-GB"/>
           </a:p>
@@ -2093,13 +1829,7 @@
       </p:sp>
       <p:sp>
         <p:nvSpPr>
-          <p:cNvPr id="3" name="Footer Placeholder 2">
-            <a:extLst>
-              <a:ext uri="{FF2B5EF4-FFF2-40B4-BE49-F238E27FC236}">
-                <a16:creationId xmlns:a16="http://schemas.microsoft.com/office/drawing/2014/main" id="{4E3C5F42-1A7D-4F20-9282-52121EAE13F4}"/>
-              </a:ext>
-            </a:extLst>
-          </p:cNvPr>
+          <p:cNvPr id="3" name="Footer Placeholder 2"/>
           <p:cNvSpPr>
             <a:spLocks noGrp="1"/>
           </p:cNvSpPr>
@@ -2118,13 +1848,7 @@
       </p:sp>
       <p:sp>
         <p:nvSpPr>
-          <p:cNvPr id="4" name="Slide Number Placeholder 3">
-            <a:extLst>
-              <a:ext uri="{FF2B5EF4-FFF2-40B4-BE49-F238E27FC236}">
-                <a16:creationId xmlns:a16="http://schemas.microsoft.com/office/drawing/2014/main" id="{402F3825-7840-40EB-BBEB-D5A058FCA87A}"/>
-              </a:ext>
-            </a:extLst>
-          </p:cNvPr>
+          <p:cNvPr id="4" name="Slide Number Placeholder 3"/>
           <p:cNvSpPr>
             <a:spLocks noGrp="1"/>
           </p:cNvSpPr>
@@ -2148,7 +1872,7 @@
     </p:spTree>
     <p:extLst>
       <p:ext uri="{BB962C8B-B14F-4D97-AF65-F5344CB8AC3E}">
-        <p14:creationId xmlns:p14="http://schemas.microsoft.com/office/powerpoint/2010/main" val="339464806"/>
+        <p14:creationId xmlns:p14="http://schemas.microsoft.com/office/powerpoint/2010/main" val="1450343311"/>
       </p:ext>
     </p:extLst>
   </p:cSld>
@@ -2177,13 +1901,7 @@
       </p:grpSpPr>
       <p:sp>
         <p:nvSpPr>
-          <p:cNvPr id="2" name="Title 1">
-            <a:extLst>
-              <a:ext uri="{FF2B5EF4-FFF2-40B4-BE49-F238E27FC236}">
-                <a16:creationId xmlns:a16="http://schemas.microsoft.com/office/drawing/2014/main" id="{E714465D-61D8-42CD-8D3E-AB3B402B7F04}"/>
-              </a:ext>
-            </a:extLst>
-          </p:cNvPr>
+          <p:cNvPr id="2" name="Title 1"/>
           <p:cNvSpPr>
             <a:spLocks noGrp="1"/>
           </p:cNvSpPr>
@@ -2193,8 +1911,8 @@
         </p:nvSpPr>
         <p:spPr>
           <a:xfrm>
-            <a:off x="839788" y="457200"/>
-            <a:ext cx="3932237" cy="1600200"/>
+            <a:off x="1487782" y="457200"/>
+            <a:ext cx="6966408" cy="1600200"/>
           </a:xfrm>
         </p:spPr>
         <p:txBody>
@@ -2209,19 +1927,13 @@
               <a:rPr lang="en-US"/>
               <a:t>Click to edit Master title style</a:t>
             </a:r>
-            <a:endParaRPr lang="en-GB"/>
+            <a:endParaRPr lang="en-US" dirty="0"/>
           </a:p>
         </p:txBody>
       </p:sp>
       <p:sp>
         <p:nvSpPr>
-          <p:cNvPr id="3" name="Content Placeholder 2">
-            <a:extLst>
-              <a:ext uri="{FF2B5EF4-FFF2-40B4-BE49-F238E27FC236}">
-                <a16:creationId xmlns:a16="http://schemas.microsoft.com/office/drawing/2014/main" id="{638E9C8F-2AD6-4728-9860-D378544A5AE9}"/>
-              </a:ext>
-            </a:extLst>
-          </p:cNvPr>
+          <p:cNvPr id="3" name="Content Placeholder 2"/>
           <p:cNvSpPr>
             <a:spLocks noGrp="1"/>
           </p:cNvSpPr>
@@ -2231,8 +1943,8 @@
         </p:nvSpPr>
         <p:spPr>
           <a:xfrm>
-            <a:off x="5183188" y="987425"/>
-            <a:ext cx="6172200" cy="4873625"/>
+            <a:off x="9182611" y="987426"/>
+            <a:ext cx="10934760" cy="4873625"/>
           </a:xfrm>
         </p:spPr>
         <p:txBody>
@@ -2300,19 +2012,13 @@
               <a:rPr lang="en-US"/>
               <a:t>Fifth level</a:t>
             </a:r>
-            <a:endParaRPr lang="en-GB"/>
+            <a:endParaRPr lang="en-US" dirty="0"/>
           </a:p>
         </p:txBody>
       </p:sp>
       <p:sp>
         <p:nvSpPr>
-          <p:cNvPr id="4" name="Text Placeholder 3">
-            <a:extLst>
-              <a:ext uri="{FF2B5EF4-FFF2-40B4-BE49-F238E27FC236}">
-                <a16:creationId xmlns:a16="http://schemas.microsoft.com/office/drawing/2014/main" id="{51A1ECA3-4315-4E00-9B4A-D2340D6F5343}"/>
-              </a:ext>
-            </a:extLst>
-          </p:cNvPr>
+          <p:cNvPr id="4" name="Text Placeholder 3"/>
           <p:cNvSpPr>
             <a:spLocks noGrp="1"/>
           </p:cNvSpPr>
@@ -2322,8 +2028,8 @@
         </p:nvSpPr>
         <p:spPr>
           <a:xfrm>
-            <a:off x="839788" y="2057400"/>
-            <a:ext cx="3932237" cy="3811588"/>
+            <a:off x="1487782" y="2057400"/>
+            <a:ext cx="6966408" cy="3811588"/>
           </a:xfrm>
         </p:spPr>
         <p:txBody>
@@ -2377,13 +2083,7 @@
       </p:sp>
       <p:sp>
         <p:nvSpPr>
-          <p:cNvPr id="5" name="Date Placeholder 4">
-            <a:extLst>
-              <a:ext uri="{FF2B5EF4-FFF2-40B4-BE49-F238E27FC236}">
-                <a16:creationId xmlns:a16="http://schemas.microsoft.com/office/drawing/2014/main" id="{28F2EC32-7D01-4CAC-A5E9-D8BBA8B011EE}"/>
-              </a:ext>
-            </a:extLst>
-          </p:cNvPr>
+          <p:cNvPr id="5" name="Date Placeholder 4"/>
           <p:cNvSpPr>
             <a:spLocks noGrp="1"/>
           </p:cNvSpPr>
@@ -2398,7 +2098,7 @@
           <a:p>
             <a:fld id="{8B1A925D-6802-4F82-B3A4-43BDB522D203}" type="datetimeFigureOut">
               <a:rPr lang="en-GB" smtClean="0"/>
-              <a:t>09/09/2022</a:t>
+              <a:t>30/09/2022</a:t>
             </a:fld>
             <a:endParaRPr lang="en-GB"/>
           </a:p>
@@ -2406,13 +2106,7 @@
       </p:sp>
       <p:sp>
         <p:nvSpPr>
-          <p:cNvPr id="6" name="Footer Placeholder 5">
-            <a:extLst>
-              <a:ext uri="{FF2B5EF4-FFF2-40B4-BE49-F238E27FC236}">
-                <a16:creationId xmlns:a16="http://schemas.microsoft.com/office/drawing/2014/main" id="{CBEC1967-0E6E-4BB5-96D1-B61AA751BAAF}"/>
-              </a:ext>
-            </a:extLst>
-          </p:cNvPr>
+          <p:cNvPr id="6" name="Footer Placeholder 5"/>
           <p:cNvSpPr>
             <a:spLocks noGrp="1"/>
           </p:cNvSpPr>
@@ -2431,13 +2125,7 @@
       </p:sp>
       <p:sp>
         <p:nvSpPr>
-          <p:cNvPr id="7" name="Slide Number Placeholder 6">
-            <a:extLst>
-              <a:ext uri="{FF2B5EF4-FFF2-40B4-BE49-F238E27FC236}">
-                <a16:creationId xmlns:a16="http://schemas.microsoft.com/office/drawing/2014/main" id="{6DEFA8B5-EFA7-4E88-83DB-15D002BC1614}"/>
-              </a:ext>
-            </a:extLst>
-          </p:cNvPr>
+          <p:cNvPr id="7" name="Slide Number Placeholder 6"/>
           <p:cNvSpPr>
             <a:spLocks noGrp="1"/>
           </p:cNvSpPr>
@@ -2461,7 +2149,7 @@
     </p:spTree>
     <p:extLst>
       <p:ext uri="{BB962C8B-B14F-4D97-AF65-F5344CB8AC3E}">
-        <p14:creationId xmlns:p14="http://schemas.microsoft.com/office/powerpoint/2010/main" val="2947349766"/>
+        <p14:creationId xmlns:p14="http://schemas.microsoft.com/office/powerpoint/2010/main" val="3472640055"/>
       </p:ext>
     </p:extLst>
   </p:cSld>
@@ -2490,13 +2178,7 @@
       </p:grpSpPr>
       <p:sp>
         <p:nvSpPr>
-          <p:cNvPr id="2" name="Title 1">
-            <a:extLst>
-              <a:ext uri="{FF2B5EF4-FFF2-40B4-BE49-F238E27FC236}">
-                <a16:creationId xmlns:a16="http://schemas.microsoft.com/office/drawing/2014/main" id="{CA76872C-3717-40C4-B7AC-BF6DEFA74F6D}"/>
-              </a:ext>
-            </a:extLst>
-          </p:cNvPr>
+          <p:cNvPr id="2" name="Title 1"/>
           <p:cNvSpPr>
             <a:spLocks noGrp="1"/>
           </p:cNvSpPr>
@@ -2506,8 +2188,8 @@
         </p:nvSpPr>
         <p:spPr>
           <a:xfrm>
-            <a:off x="839788" y="457200"/>
-            <a:ext cx="3932237" cy="1600200"/>
+            <a:off x="1487782" y="457200"/>
+            <a:ext cx="6966408" cy="1600200"/>
           </a:xfrm>
         </p:spPr>
         <p:txBody>
@@ -2522,21 +2204,15 @@
               <a:rPr lang="en-US"/>
               <a:t>Click to edit Master title style</a:t>
             </a:r>
-            <a:endParaRPr lang="en-GB"/>
+            <a:endParaRPr lang="en-US" dirty="0"/>
           </a:p>
         </p:txBody>
       </p:sp>
       <p:sp>
         <p:nvSpPr>
-          <p:cNvPr id="3" name="Picture Placeholder 2">
-            <a:extLst>
-              <a:ext uri="{FF2B5EF4-FFF2-40B4-BE49-F238E27FC236}">
-                <a16:creationId xmlns:a16="http://schemas.microsoft.com/office/drawing/2014/main" id="{570A4AC5-A08C-4B4A-9226-5AD37BF5AAF1}"/>
-              </a:ext>
-            </a:extLst>
-          </p:cNvPr>
+          <p:cNvPr id="3" name="Picture Placeholder 2"/>
           <p:cNvSpPr>
-            <a:spLocks noGrp="1"/>
+            <a:spLocks noGrp="1" noChangeAspect="1"/>
           </p:cNvSpPr>
           <p:nvPr>
             <p:ph type="pic" idx="1"/>
@@ -2544,12 +2220,12 @@
         </p:nvSpPr>
         <p:spPr>
           <a:xfrm>
-            <a:off x="5183188" y="987425"/>
-            <a:ext cx="6172200" cy="4873625"/>
+            <a:off x="9182611" y="987426"/>
+            <a:ext cx="10934760" cy="4873625"/>
           </a:xfrm>
         </p:spPr>
         <p:txBody>
-          <a:bodyPr/>
+          <a:bodyPr anchor="t"/>
           <a:lstStyle>
             <a:lvl1pPr marL="0" indent="0">
               <a:buNone/>
@@ -2589,19 +2265,17 @@
             </a:lvl9pPr>
           </a:lstStyle>
           <a:p>
-            <a:endParaRPr lang="en-GB"/>
+            <a:r>
+              <a:rPr lang="en-US"/>
+              <a:t>Click icon to add picture</a:t>
+            </a:r>
+            <a:endParaRPr lang="en-US" dirty="0"/>
           </a:p>
         </p:txBody>
       </p:sp>
       <p:sp>
         <p:nvSpPr>
-          <p:cNvPr id="4" name="Text Placeholder 3">
-            <a:extLst>
-              <a:ext uri="{FF2B5EF4-FFF2-40B4-BE49-F238E27FC236}">
-                <a16:creationId xmlns:a16="http://schemas.microsoft.com/office/drawing/2014/main" id="{25C7023B-14B1-4199-B40C-F8D0CF50BFDB}"/>
-              </a:ext>
-            </a:extLst>
-          </p:cNvPr>
+          <p:cNvPr id="4" name="Text Placeholder 3"/>
           <p:cNvSpPr>
             <a:spLocks noGrp="1"/>
           </p:cNvSpPr>
@@ -2611,8 +2285,8 @@
         </p:nvSpPr>
         <p:spPr>
           <a:xfrm>
-            <a:off x="839788" y="2057400"/>
-            <a:ext cx="3932237" cy="3811588"/>
+            <a:off x="1487782" y="2057400"/>
+            <a:ext cx="6966408" cy="3811588"/>
           </a:xfrm>
         </p:spPr>
         <p:txBody>
@@ -2666,13 +2340,7 @@
       </p:sp>
       <p:sp>
         <p:nvSpPr>
-          <p:cNvPr id="5" name="Date Placeholder 4">
-            <a:extLst>
-              <a:ext uri="{FF2B5EF4-FFF2-40B4-BE49-F238E27FC236}">
-                <a16:creationId xmlns:a16="http://schemas.microsoft.com/office/drawing/2014/main" id="{0EF12200-7AB7-4A7A-ADC8-C6BA5F6DDCB3}"/>
-              </a:ext>
-            </a:extLst>
-          </p:cNvPr>
+          <p:cNvPr id="5" name="Date Placeholder 4"/>
           <p:cNvSpPr>
             <a:spLocks noGrp="1"/>
           </p:cNvSpPr>
@@ -2687,7 +2355,7 @@
           <a:p>
             <a:fld id="{8B1A925D-6802-4F82-B3A4-43BDB522D203}" type="datetimeFigureOut">
               <a:rPr lang="en-GB" smtClean="0"/>
-              <a:t>09/09/2022</a:t>
+              <a:t>30/09/2022</a:t>
             </a:fld>
             <a:endParaRPr lang="en-GB"/>
           </a:p>
@@ -2695,13 +2363,7 @@
       </p:sp>
       <p:sp>
         <p:nvSpPr>
-          <p:cNvPr id="6" name="Footer Placeholder 5">
-            <a:extLst>
-              <a:ext uri="{FF2B5EF4-FFF2-40B4-BE49-F238E27FC236}">
-                <a16:creationId xmlns:a16="http://schemas.microsoft.com/office/drawing/2014/main" id="{7BB271C8-BE22-4475-AA22-9929F9DEF447}"/>
-              </a:ext>
-            </a:extLst>
-          </p:cNvPr>
+          <p:cNvPr id="6" name="Footer Placeholder 5"/>
           <p:cNvSpPr>
             <a:spLocks noGrp="1"/>
           </p:cNvSpPr>
@@ -2720,13 +2382,7 @@
       </p:sp>
       <p:sp>
         <p:nvSpPr>
-          <p:cNvPr id="7" name="Slide Number Placeholder 6">
-            <a:extLst>
-              <a:ext uri="{FF2B5EF4-FFF2-40B4-BE49-F238E27FC236}">
-                <a16:creationId xmlns:a16="http://schemas.microsoft.com/office/drawing/2014/main" id="{E5103997-6123-4A4E-A57D-0A229B7D129C}"/>
-              </a:ext>
-            </a:extLst>
-          </p:cNvPr>
+          <p:cNvPr id="7" name="Slide Number Placeholder 6"/>
           <p:cNvSpPr>
             <a:spLocks noGrp="1"/>
           </p:cNvSpPr>
@@ -2750,7 +2406,7 @@
     </p:spTree>
     <p:extLst>
       <p:ext uri="{BB962C8B-B14F-4D97-AF65-F5344CB8AC3E}">
-        <p14:creationId xmlns:p14="http://schemas.microsoft.com/office/powerpoint/2010/main" val="1305126391"/>
+        <p14:creationId xmlns:p14="http://schemas.microsoft.com/office/powerpoint/2010/main" val="1417308719"/>
       </p:ext>
     </p:extLst>
   </p:cSld>
@@ -2784,13 +2440,7 @@
       </p:grpSpPr>
       <p:sp>
         <p:nvSpPr>
-          <p:cNvPr id="2" name="Title Placeholder 1">
-            <a:extLst>
-              <a:ext uri="{FF2B5EF4-FFF2-40B4-BE49-F238E27FC236}">
-                <a16:creationId xmlns:a16="http://schemas.microsoft.com/office/drawing/2014/main" id="{C79C744C-BE56-445C-A88F-34827926DA75}"/>
-              </a:ext>
-            </a:extLst>
-          </p:cNvPr>
+          <p:cNvPr id="2" name="Title Placeholder 1"/>
           <p:cNvSpPr>
             <a:spLocks noGrp="1"/>
           </p:cNvSpPr>
@@ -2800,8 +2450,8 @@
         </p:nvSpPr>
         <p:spPr>
           <a:xfrm>
-            <a:off x="838200" y="365125"/>
-            <a:ext cx="10515600" cy="1325563"/>
+            <a:off x="1484968" y="365126"/>
+            <a:ext cx="18629590" cy="1325563"/>
           </a:xfrm>
           <a:prstGeom prst="rect">
             <a:avLst/>
@@ -2817,19 +2467,13 @@
               <a:rPr lang="en-US"/>
               <a:t>Click to edit Master title style</a:t>
             </a:r>
-            <a:endParaRPr lang="en-GB"/>
+            <a:endParaRPr lang="en-US" dirty="0"/>
           </a:p>
         </p:txBody>
       </p:sp>
       <p:sp>
         <p:nvSpPr>
-          <p:cNvPr id="3" name="Text Placeholder 2">
-            <a:extLst>
-              <a:ext uri="{FF2B5EF4-FFF2-40B4-BE49-F238E27FC236}">
-                <a16:creationId xmlns:a16="http://schemas.microsoft.com/office/drawing/2014/main" id="{ED060F42-EECC-40B0-A931-81E743CCED0C}"/>
-              </a:ext>
-            </a:extLst>
-          </p:cNvPr>
+          <p:cNvPr id="3" name="Text Placeholder 2"/>
           <p:cNvSpPr>
             <a:spLocks noGrp="1"/>
           </p:cNvSpPr>
@@ -2839,8 +2483,8 @@
         </p:nvSpPr>
         <p:spPr>
           <a:xfrm>
-            <a:off x="838200" y="1825625"/>
-            <a:ext cx="10515600" cy="4351338"/>
+            <a:off x="1484968" y="1825625"/>
+            <a:ext cx="18629590" cy="4351338"/>
           </a:xfrm>
           <a:prstGeom prst="rect">
             <a:avLst/>
@@ -2885,19 +2529,13 @@
               <a:rPr lang="en-US"/>
               <a:t>Fifth level</a:t>
             </a:r>
-            <a:endParaRPr lang="en-GB"/>
+            <a:endParaRPr lang="en-US" dirty="0"/>
           </a:p>
         </p:txBody>
       </p:sp>
       <p:sp>
         <p:nvSpPr>
-          <p:cNvPr id="4" name="Date Placeholder 3">
-            <a:extLst>
-              <a:ext uri="{FF2B5EF4-FFF2-40B4-BE49-F238E27FC236}">
-                <a16:creationId xmlns:a16="http://schemas.microsoft.com/office/drawing/2014/main" id="{8E245693-45D8-4B81-8824-06AD811D4D80}"/>
-              </a:ext>
-            </a:extLst>
-          </p:cNvPr>
+          <p:cNvPr id="4" name="Date Placeholder 3"/>
           <p:cNvSpPr>
             <a:spLocks noGrp="1"/>
           </p:cNvSpPr>
@@ -2907,8 +2545,8 @@
         </p:nvSpPr>
         <p:spPr>
           <a:xfrm>
-            <a:off x="838200" y="6356350"/>
-            <a:ext cx="2743200" cy="365125"/>
+            <a:off x="1484967" y="6356351"/>
+            <a:ext cx="4859893" cy="365125"/>
           </a:xfrm>
           <a:prstGeom prst="rect">
             <a:avLst/>
@@ -2930,7 +2568,7 @@
           <a:p>
             <a:fld id="{8B1A925D-6802-4F82-B3A4-43BDB522D203}" type="datetimeFigureOut">
               <a:rPr lang="en-GB" smtClean="0"/>
-              <a:t>09/09/2022</a:t>
+              <a:t>30/09/2022</a:t>
             </a:fld>
             <a:endParaRPr lang="en-GB"/>
           </a:p>
@@ -2938,13 +2576,7 @@
       </p:sp>
       <p:sp>
         <p:nvSpPr>
-          <p:cNvPr id="5" name="Footer Placeholder 4">
-            <a:extLst>
-              <a:ext uri="{FF2B5EF4-FFF2-40B4-BE49-F238E27FC236}">
-                <a16:creationId xmlns:a16="http://schemas.microsoft.com/office/drawing/2014/main" id="{43497F4B-D011-4D73-AF33-6F8BFACCF361}"/>
-              </a:ext>
-            </a:extLst>
-          </p:cNvPr>
+          <p:cNvPr id="5" name="Footer Placeholder 4"/>
           <p:cNvSpPr>
             <a:spLocks noGrp="1"/>
           </p:cNvSpPr>
@@ -2954,8 +2586,8 @@
         </p:nvSpPr>
         <p:spPr>
           <a:xfrm>
-            <a:off x="4038600" y="6356350"/>
-            <a:ext cx="4114800" cy="365125"/>
+            <a:off x="7154843" y="6356351"/>
+            <a:ext cx="7289840" cy="365125"/>
           </a:xfrm>
           <a:prstGeom prst="rect">
             <a:avLst/>
@@ -2981,13 +2613,7 @@
       </p:sp>
       <p:sp>
         <p:nvSpPr>
-          <p:cNvPr id="6" name="Slide Number Placeholder 5">
-            <a:extLst>
-              <a:ext uri="{FF2B5EF4-FFF2-40B4-BE49-F238E27FC236}">
-                <a16:creationId xmlns:a16="http://schemas.microsoft.com/office/drawing/2014/main" id="{321BA796-8284-45EB-BDD6-4D53C3132E1C}"/>
-              </a:ext>
-            </a:extLst>
-          </p:cNvPr>
+          <p:cNvPr id="6" name="Slide Number Placeholder 5"/>
           <p:cNvSpPr>
             <a:spLocks noGrp="1"/>
           </p:cNvSpPr>
@@ -2997,8 +2623,8 @@
         </p:nvSpPr>
         <p:spPr>
           <a:xfrm>
-            <a:off x="8610600" y="6356350"/>
-            <a:ext cx="2743200" cy="365125"/>
+            <a:off x="15254665" y="6356351"/>
+            <a:ext cx="4859893" cy="365125"/>
           </a:xfrm>
           <a:prstGeom prst="rect">
             <a:avLst/>
@@ -3029,23 +2655,23 @@
     </p:spTree>
     <p:extLst>
       <p:ext uri="{BB962C8B-B14F-4D97-AF65-F5344CB8AC3E}">
-        <p14:creationId xmlns:p14="http://schemas.microsoft.com/office/powerpoint/2010/main" val="2380536280"/>
+        <p14:creationId xmlns:p14="http://schemas.microsoft.com/office/powerpoint/2010/main" val="131129098"/>
       </p:ext>
     </p:extLst>
   </p:cSld>
   <p:clrMap bg1="lt1" tx1="dk1" bg2="lt2" tx2="dk2" accent1="accent1" accent2="accent2" accent3="accent3" accent4="accent4" accent5="accent5" accent6="accent6" hlink="hlink" folHlink="folHlink"/>
   <p:sldLayoutIdLst>
-    <p:sldLayoutId id="2147483649" r:id="rId1"/>
-    <p:sldLayoutId id="2147483650" r:id="rId2"/>
-    <p:sldLayoutId id="2147483651" r:id="rId3"/>
-    <p:sldLayoutId id="2147483652" r:id="rId4"/>
-    <p:sldLayoutId id="2147483653" r:id="rId5"/>
-    <p:sldLayoutId id="2147483654" r:id="rId6"/>
-    <p:sldLayoutId id="2147483655" r:id="rId7"/>
-    <p:sldLayoutId id="2147483656" r:id="rId8"/>
-    <p:sldLayoutId id="2147483657" r:id="rId9"/>
-    <p:sldLayoutId id="2147483658" r:id="rId10"/>
-    <p:sldLayoutId id="2147483659" r:id="rId11"/>
+    <p:sldLayoutId id="2147483673" r:id="rId1"/>
+    <p:sldLayoutId id="2147483674" r:id="rId2"/>
+    <p:sldLayoutId id="2147483675" r:id="rId3"/>
+    <p:sldLayoutId id="2147483676" r:id="rId4"/>
+    <p:sldLayoutId id="2147483677" r:id="rId5"/>
+    <p:sldLayoutId id="2147483678" r:id="rId6"/>
+    <p:sldLayoutId id="2147483679" r:id="rId7"/>
+    <p:sldLayoutId id="2147483680" r:id="rId8"/>
+    <p:sldLayoutId id="2147483681" r:id="rId9"/>
+    <p:sldLayoutId id="2147483682" r:id="rId10"/>
+    <p:sldLayoutId id="2147483683" r:id="rId11"/>
   </p:sldLayoutIdLst>
   <p:txStyles>
     <p:titleStyle>
@@ -3361,7 +2987,7 @@
         </p:nvSpPr>
         <p:spPr>
           <a:xfrm>
-            <a:off x="329809" y="3268370"/>
+            <a:off x="475425" y="3323789"/>
             <a:ext cx="3870000" cy="2376000"/>
           </a:xfrm>
           <a:prstGeom prst="rect">
@@ -3434,7 +3060,7 @@
         </p:nvSpPr>
         <p:spPr>
           <a:xfrm>
-            <a:off x="329809" y="2513105"/>
+            <a:off x="475425" y="2568523"/>
             <a:ext cx="3870000" cy="2376000"/>
           </a:xfrm>
           <a:prstGeom prst="rect">
@@ -3508,7 +3134,7 @@
         </p:nvGrpSpPr>
         <p:grpSpPr>
           <a:xfrm>
-            <a:off x="330139" y="1844963"/>
+            <a:off x="475755" y="1900381"/>
             <a:ext cx="3736000" cy="2269254"/>
             <a:chOff x="1055426" y="3196138"/>
             <a:chExt cx="3736000" cy="2269254"/>
@@ -13615,7 +13241,7 @@
         </p:nvSpPr>
         <p:spPr>
           <a:xfrm>
-            <a:off x="359198" y="1068340"/>
+            <a:off x="504814" y="1123759"/>
             <a:ext cx="3870000" cy="2376000"/>
           </a:xfrm>
           <a:prstGeom prst="rect">
@@ -13689,7 +13315,7 @@
         </p:nvSpPr>
         <p:spPr>
           <a:xfrm>
-            <a:off x="329809" y="356807"/>
+            <a:off x="475425" y="412225"/>
             <a:ext cx="3870000" cy="2376000"/>
           </a:xfrm>
           <a:prstGeom prst="rect">
@@ -13764,7 +13390,7 @@
         </p:nvSpPr>
         <p:spPr>
           <a:xfrm>
-            <a:off x="332018" y="-376425"/>
+            <a:off x="477634" y="-321007"/>
             <a:ext cx="3870000" cy="2376000"/>
           </a:xfrm>
           <a:prstGeom prst="frame">
@@ -13843,7 +13469,7 @@
         </p:nvSpPr>
         <p:spPr>
           <a:xfrm>
-            <a:off x="4606301" y="883674"/>
+            <a:off x="4751919" y="939094"/>
             <a:ext cx="2946539" cy="461665"/>
           </a:xfrm>
           <a:prstGeom prst="rect">
@@ -13881,7 +13507,7 @@
         </p:nvSpPr>
         <p:spPr>
           <a:xfrm>
-            <a:off x="4606300" y="1630243"/>
+            <a:off x="4751918" y="1685664"/>
             <a:ext cx="2946539" cy="461665"/>
           </a:xfrm>
           <a:prstGeom prst="rect">
@@ -13919,7 +13545,7 @@
         </p:nvSpPr>
         <p:spPr>
           <a:xfrm>
-            <a:off x="4607645" y="2310427"/>
+            <a:off x="4753264" y="2365847"/>
             <a:ext cx="2946539" cy="461665"/>
           </a:xfrm>
           <a:prstGeom prst="rect">
@@ -13957,7 +13583,7 @@
         </p:nvSpPr>
         <p:spPr>
           <a:xfrm>
-            <a:off x="4591478" y="3755764"/>
+            <a:off x="4737097" y="3811184"/>
             <a:ext cx="2946539" cy="461665"/>
           </a:xfrm>
           <a:prstGeom prst="rect">
@@ -13995,7 +13621,7 @@
         </p:nvSpPr>
         <p:spPr>
           <a:xfrm>
-            <a:off x="4606299" y="3034438"/>
+            <a:off x="4751917" y="3089858"/>
             <a:ext cx="2946539" cy="461665"/>
           </a:xfrm>
           <a:prstGeom prst="rect">
@@ -14033,7 +13659,7 @@
         </p:nvSpPr>
         <p:spPr>
           <a:xfrm>
-            <a:off x="4602151" y="4582754"/>
+            <a:off x="4747769" y="4638174"/>
             <a:ext cx="3556427" cy="461665"/>
           </a:xfrm>
           <a:prstGeom prst="rect">
@@ -14064,6 +13690,41 @@
           </a:p>
         </p:txBody>
       </p:sp>
+      <p:pic>
+        <p:nvPicPr>
+          <p:cNvPr id="4" name="Picture 3" descr="Chart, treemap chart&#10;&#10;Description automatically generated">
+            <a:extLst>
+              <a:ext uri="{FF2B5EF4-FFF2-40B4-BE49-F238E27FC236}">
+                <a16:creationId xmlns:a16="http://schemas.microsoft.com/office/drawing/2014/main" id="{623CEA8E-3B98-479F-83EF-4FD7F8D4CDD4}"/>
+              </a:ext>
+            </a:extLst>
+          </p:cNvPr>
+          <p:cNvPicPr>
+            <a:picLocks noChangeAspect="1"/>
+          </p:cNvPicPr>
+          <p:nvPr/>
+        </p:nvPicPr>
+        <p:blipFill rotWithShape="1">
+          <a:blip r:embed="rId2">
+            <a:extLst>
+              <a:ext uri="{28A0092B-C50C-407E-A947-70E740481C1C}">
+                <a14:useLocalDpi xmlns:a14="http://schemas.microsoft.com/office/drawing/2010/main" val="0"/>
+              </a:ext>
+            </a:extLst>
+          </a:blip>
+          <a:srcRect r="48379"/>
+          <a:stretch/>
+        </p:blipFill>
+        <p:spPr>
+          <a:xfrm>
+            <a:off x="8085980" y="10938"/>
+            <a:ext cx="8009005" cy="5433897"/>
+          </a:xfrm>
+          <a:prstGeom prst="rect">
+            <a:avLst/>
+          </a:prstGeom>
+        </p:spPr>
+      </p:pic>
     </p:spTree>
     <p:extLst>
       <p:ext uri="{BB962C8B-B14F-4D97-AF65-F5344CB8AC3E}">
@@ -14080,7 +13741,7 @@
 <file path=ppt/theme/theme1.xml><?xml version="1.0" encoding="utf-8"?>
 <a:theme xmlns:a="http://schemas.openxmlformats.org/drawingml/2006/main" name="Office Theme">
   <a:themeElements>
-    <a:clrScheme name="Office">
+    <a:clrScheme name="Office Theme">
       <a:dk1>
         <a:sysClr val="windowText" lastClr="000000"/>
       </a:dk1>
@@ -14118,7 +13779,7 @@
         <a:srgbClr val="954F72"/>
       </a:folHlink>
     </a:clrScheme>
-    <a:fontScheme name="Office">
+    <a:fontScheme name="Office Theme">
       <a:majorFont>
         <a:latin typeface="Calibri Light" panose="020F0302020204030204"/>
         <a:ea typeface=""/>
@@ -14153,23 +13814,6 @@
         <a:font script="Viet" typeface="Times New Roman"/>
         <a:font script="Uigh" typeface="Microsoft Uighur"/>
         <a:font script="Geor" typeface="Sylfaen"/>
-        <a:font script="Armn" typeface="Arial"/>
-        <a:font script="Bugi" typeface="Leelawadee UI"/>
-        <a:font script="Bopo" typeface="Microsoft JhengHei"/>
-        <a:font script="Java" typeface="Javanese Text"/>
-        <a:font script="Lisu" typeface="Segoe UI"/>
-        <a:font script="Mymr" typeface="Myanmar Text"/>
-        <a:font script="Nkoo" typeface="Ebrima"/>
-        <a:font script="Olck" typeface="Nirmala UI"/>
-        <a:font script="Osma" typeface="Ebrima"/>
-        <a:font script="Phag" typeface="Phagspa"/>
-        <a:font script="Syrn" typeface="Estrangelo Edessa"/>
-        <a:font script="Syrj" typeface="Estrangelo Edessa"/>
-        <a:font script="Syre" typeface="Estrangelo Edessa"/>
-        <a:font script="Sora" typeface="Nirmala UI"/>
-        <a:font script="Tale" typeface="Microsoft Tai Le"/>
-        <a:font script="Talu" typeface="Microsoft New Tai Lue"/>
-        <a:font script="Tfng" typeface="Ebrima"/>
       </a:majorFont>
       <a:minorFont>
         <a:latin typeface="Calibri" panose="020F0502020204030204"/>
@@ -14205,26 +13849,9 @@
         <a:font script="Viet" typeface="Arial"/>
         <a:font script="Uigh" typeface="Microsoft Uighur"/>
         <a:font script="Geor" typeface="Sylfaen"/>
-        <a:font script="Armn" typeface="Arial"/>
-        <a:font script="Bugi" typeface="Leelawadee UI"/>
-        <a:font script="Bopo" typeface="Microsoft JhengHei"/>
-        <a:font script="Java" typeface="Javanese Text"/>
-        <a:font script="Lisu" typeface="Segoe UI"/>
-        <a:font script="Mymr" typeface="Myanmar Text"/>
-        <a:font script="Nkoo" typeface="Ebrima"/>
-        <a:font script="Olck" typeface="Nirmala UI"/>
-        <a:font script="Osma" typeface="Ebrima"/>
-        <a:font script="Phag" typeface="Phagspa"/>
-        <a:font script="Syrn" typeface="Estrangelo Edessa"/>
-        <a:font script="Syrj" typeface="Estrangelo Edessa"/>
-        <a:font script="Syre" typeface="Estrangelo Edessa"/>
-        <a:font script="Sora" typeface="Nirmala UI"/>
-        <a:font script="Tale" typeface="Microsoft Tai Le"/>
-        <a:font script="Talu" typeface="Microsoft New Tai Lue"/>
-        <a:font script="Tfng" typeface="Ebrima"/>
       </a:minorFont>
     </a:fontScheme>
-    <a:fmtScheme name="Office">
+    <a:fmtScheme name="Office Theme">
       <a:fillStyleLst>
         <a:solidFill>
           <a:schemeClr val="phClr"/>

</xml_diff>